<commit_message>
Updating the presentation with icons
</commit_message>
<xml_diff>
--- a/Logging with Serilog+Elastichsearch+Kibana.pptx
+++ b/Logging with Serilog+Elastichsearch+Kibana.pptx
@@ -2386,7 +2386,30 @@
     </dgm:pt>
     <dgm:pt modelId="{9D72FC78-C377-4C25-89A3-CCB4C2E5D05F}" type="pres">
       <dgm:prSet presAssocID="{4B75A8EC-41EB-47FC-B09D-548A1E8230D9}" presName="iconRect" presStyleLbl="node1" presStyleIdx="3" presStyleCnt="5"/>
-      <dgm:spPr/>
+      <dgm:spPr>
+        <a:blipFill>
+          <a:blip xmlns:r="http://schemas.openxmlformats.org/officeDocument/2006/relationships" r:embed="rId7">
+            <a:lum bright="70000" contrast="-70000"/>
+            <a:extLst>
+              <a:ext uri="{28A0092B-C50C-407E-A947-70E740481C1C}">
+                <a14:useLocalDpi xmlns:a14="http://schemas.microsoft.com/office/drawing/2010/main" val="0"/>
+              </a:ext>
+              <a:ext uri="{96DAC541-7B7A-43D3-8B79-37D633B846F1}">
+                <asvg:svgBlip xmlns:asvg="http://schemas.microsoft.com/office/drawing/2016/SVG/main" r:embed="rId8"/>
+              </a:ext>
+            </a:extLst>
+          </a:blip>
+          <a:srcRect/>
+          <a:stretch>
+            <a:fillRect/>
+          </a:stretch>
+        </a:blipFill>
+      </dgm:spPr>
+      <dgm:extLst>
+        <a:ext uri="{E40237B7-FDA0-4F09-8148-C483321AD2D9}">
+          <dgm14:cNvPr xmlns:dgm14="http://schemas.microsoft.com/office/drawing/2010/diagram" id="0" name="" descr="Vínculo"/>
+        </a:ext>
+      </dgm:extLst>
     </dgm:pt>
     <dgm:pt modelId="{21D996C8-B0CB-4E4B-B837-B86CBF8A34B2}" type="pres">
       <dgm:prSet presAssocID="{4B75A8EC-41EB-47FC-B09D-548A1E8230D9}" presName="spaceRect" presStyleCnt="0"/>
@@ -2424,13 +2447,13 @@
       <dgm:prSet presAssocID="{06F739B4-9D64-4E33-BDF2-40BC9891E0C9}" presName="iconRect" presStyleLbl="node1" presStyleIdx="4" presStyleCnt="5"/>
       <dgm:spPr>
         <a:blipFill>
-          <a:blip xmlns:r="http://schemas.openxmlformats.org/officeDocument/2006/relationships" r:embed="rId7">
+          <a:blip xmlns:r="http://schemas.openxmlformats.org/officeDocument/2006/relationships" r:embed="rId9">
             <a:extLst>
               <a:ext uri="{28A0092B-C50C-407E-A947-70E740481C1C}">
                 <a14:useLocalDpi xmlns:a14="http://schemas.microsoft.com/office/drawing/2010/main" val="0"/>
               </a:ext>
               <a:ext uri="{96DAC541-7B7A-43D3-8B79-37D633B846F1}">
-                <asvg:svgBlip xmlns:asvg="http://schemas.microsoft.com/office/drawing/2016/SVG/main" r:embed="rId8"/>
+                <asvg:svgBlip xmlns:asvg="http://schemas.microsoft.com/office/drawing/2016/SVG/main" r:embed="rId10"/>
               </a:ext>
             </a:extLst>
           </a:blip>
@@ -2762,7 +2785,30 @@
     </dgm:pt>
     <dgm:pt modelId="{6C6FBEC4-1A51-483E-953A-539BC85DF366}" type="pres">
       <dgm:prSet presAssocID="{098E8C67-5D1F-4125-B9A9-D7F798449C94}" presName="iconRect" presStyleLbl="node1" presStyleIdx="0" presStyleCnt="4"/>
-      <dgm:spPr/>
+      <dgm:spPr>
+        <a:blipFill>
+          <a:blip xmlns:r="http://schemas.openxmlformats.org/officeDocument/2006/relationships" r:embed="rId1">
+            <a:lum bright="70000" contrast="-70000"/>
+            <a:extLst>
+              <a:ext uri="{28A0092B-C50C-407E-A947-70E740481C1C}">
+                <a14:useLocalDpi xmlns:a14="http://schemas.microsoft.com/office/drawing/2010/main" val="0"/>
+              </a:ext>
+              <a:ext uri="{96DAC541-7B7A-43D3-8B79-37D633B846F1}">
+                <asvg:svgBlip xmlns:asvg="http://schemas.microsoft.com/office/drawing/2016/SVG/main" r:embed="rId2"/>
+              </a:ext>
+            </a:extLst>
+          </a:blip>
+          <a:srcRect/>
+          <a:stretch>
+            <a:fillRect/>
+          </a:stretch>
+        </a:blipFill>
+      </dgm:spPr>
+      <dgm:extLst>
+        <a:ext uri="{E40237B7-FDA0-4F09-8148-C483321AD2D9}">
+          <dgm14:cNvPr xmlns:dgm14="http://schemas.microsoft.com/office/drawing/2010/diagram" id="0" name="" descr="Vínculo"/>
+        </a:ext>
+      </dgm:extLst>
     </dgm:pt>
     <dgm:pt modelId="{7E0D9B1F-0816-4357-8CD9-FAF578F01C45}" type="pres">
       <dgm:prSet presAssocID="{098E8C67-5D1F-4125-B9A9-D7F798449C94}" presName="spaceRect" presStyleCnt="0"/>
@@ -2800,13 +2846,13 @@
       <dgm:prSet presAssocID="{9A462B65-3A1A-4558-85D6-3209BC140E40}" presName="iconRect" presStyleLbl="node1" presStyleIdx="1" presStyleCnt="4"/>
       <dgm:spPr>
         <a:blipFill>
-          <a:blip xmlns:r="http://schemas.openxmlformats.org/officeDocument/2006/relationships" r:embed="rId1">
+          <a:blip xmlns:r="http://schemas.openxmlformats.org/officeDocument/2006/relationships" r:embed="rId3">
             <a:extLst>
               <a:ext uri="{28A0092B-C50C-407E-A947-70E740481C1C}">
                 <a14:useLocalDpi xmlns:a14="http://schemas.microsoft.com/office/drawing/2010/main" val="0"/>
               </a:ext>
               <a:ext uri="{96DAC541-7B7A-43D3-8B79-37D633B846F1}">
-                <asvg:svgBlip xmlns:asvg="http://schemas.microsoft.com/office/drawing/2016/SVG/main" r:embed="rId2"/>
+                <asvg:svgBlip xmlns:asvg="http://schemas.microsoft.com/office/drawing/2016/SVG/main" r:embed="rId4"/>
               </a:ext>
             </a:extLst>
           </a:blip>
@@ -2860,13 +2906,13 @@
       <dgm:prSet presAssocID="{CC425F53-7C46-4386-B84B-AE904A90666C}" presName="iconRect" presStyleLbl="node1" presStyleIdx="2" presStyleCnt="4"/>
       <dgm:spPr>
         <a:blipFill>
-          <a:blip xmlns:r="http://schemas.openxmlformats.org/officeDocument/2006/relationships" r:embed="rId3">
+          <a:blip xmlns:r="http://schemas.openxmlformats.org/officeDocument/2006/relationships" r:embed="rId5">
             <a:extLst>
               <a:ext uri="{28A0092B-C50C-407E-A947-70E740481C1C}">
                 <a14:useLocalDpi xmlns:a14="http://schemas.microsoft.com/office/drawing/2010/main" val="0"/>
               </a:ext>
               <a:ext uri="{96DAC541-7B7A-43D3-8B79-37D633B846F1}">
-                <asvg:svgBlip xmlns:asvg="http://schemas.microsoft.com/office/drawing/2016/SVG/main" r:embed="rId4"/>
+                <asvg:svgBlip xmlns:asvg="http://schemas.microsoft.com/office/drawing/2016/SVG/main" r:embed="rId6"/>
               </a:ext>
             </a:extLst>
           </a:blip>
@@ -2920,13 +2966,13 @@
       <dgm:prSet presAssocID="{854EA01D-54A3-4EC9-95CC-1FDD54ADC510}" presName="iconRect" presStyleLbl="node1" presStyleIdx="3" presStyleCnt="4"/>
       <dgm:spPr>
         <a:blipFill>
-          <a:blip xmlns:r="http://schemas.openxmlformats.org/officeDocument/2006/relationships" r:embed="rId5">
+          <a:blip xmlns:r="http://schemas.openxmlformats.org/officeDocument/2006/relationships" r:embed="rId7">
             <a:extLst>
               <a:ext uri="{28A0092B-C50C-407E-A947-70E740481C1C}">
                 <a14:useLocalDpi xmlns:a14="http://schemas.microsoft.com/office/drawing/2010/main" val="0"/>
               </a:ext>
               <a:ext uri="{96DAC541-7B7A-43D3-8B79-37D633B846F1}">
-                <asvg:svgBlip xmlns:asvg="http://schemas.microsoft.com/office/drawing/2016/SVG/main" r:embed="rId6"/>
+                <asvg:svgBlip xmlns:asvg="http://schemas.microsoft.com/office/drawing/2016/SVG/main" r:embed="rId8"/>
               </a:ext>
             </a:extLst>
           </a:blip>
@@ -3548,14 +3594,23 @@
         <a:prstGeom prst="rect">
           <a:avLst/>
         </a:prstGeom>
-        <a:solidFill>
-          <a:schemeClr val="bg1">
-            <a:hueOff val="0"/>
-            <a:satOff val="0"/>
-            <a:lumOff val="0"/>
-            <a:alphaOff val="0"/>
-          </a:schemeClr>
-        </a:solidFill>
+        <a:blipFill>
+          <a:blip xmlns:r="http://schemas.openxmlformats.org/officeDocument/2006/relationships" r:embed="rId7">
+            <a:lum bright="70000" contrast="-70000"/>
+            <a:extLst>
+              <a:ext uri="{28A0092B-C50C-407E-A947-70E740481C1C}">
+                <a14:useLocalDpi xmlns:a14="http://schemas.microsoft.com/office/drawing/2010/main" val="0"/>
+              </a:ext>
+              <a:ext uri="{96DAC541-7B7A-43D3-8B79-37D633B846F1}">
+                <asvg:svgBlip xmlns:asvg="http://schemas.microsoft.com/office/drawing/2016/SVG/main" r:embed="rId8"/>
+              </a:ext>
+            </a:extLst>
+          </a:blip>
+          <a:srcRect/>
+          <a:stretch>
+            <a:fillRect/>
+          </a:stretch>
+        </a:blipFill>
         <a:ln w="12700" cap="flat" cmpd="sng" algn="ctr">
           <a:solidFill>
             <a:schemeClr val="lt1">
@@ -3708,13 +3763,13 @@
           <a:avLst/>
         </a:prstGeom>
         <a:blipFill>
-          <a:blip xmlns:r="http://schemas.openxmlformats.org/officeDocument/2006/relationships" r:embed="rId7">
+          <a:blip xmlns:r="http://schemas.openxmlformats.org/officeDocument/2006/relationships" r:embed="rId9">
             <a:extLst>
               <a:ext uri="{28A0092B-C50C-407E-A947-70E740481C1C}">
                 <a14:useLocalDpi xmlns:a14="http://schemas.microsoft.com/office/drawing/2010/main" val="0"/>
               </a:ext>
               <a:ext uri="{96DAC541-7B7A-43D3-8B79-37D633B846F1}">
-                <asvg:svgBlip xmlns:asvg="http://schemas.microsoft.com/office/drawing/2016/SVG/main" r:embed="rId8"/>
+                <asvg:svgBlip xmlns:asvg="http://schemas.microsoft.com/office/drawing/2016/SVG/main" r:embed="rId10"/>
               </a:ext>
             </a:extLst>
           </a:blip>
@@ -3881,14 +3936,23 @@
         <a:prstGeom prst="rect">
           <a:avLst/>
         </a:prstGeom>
-        <a:solidFill>
-          <a:schemeClr val="bg1">
-            <a:hueOff val="0"/>
-            <a:satOff val="0"/>
-            <a:lumOff val="0"/>
-            <a:alphaOff val="0"/>
-          </a:schemeClr>
-        </a:solidFill>
+        <a:blipFill>
+          <a:blip xmlns:r="http://schemas.openxmlformats.org/officeDocument/2006/relationships" r:embed="rId1">
+            <a:lum bright="70000" contrast="-70000"/>
+            <a:extLst>
+              <a:ext uri="{28A0092B-C50C-407E-A947-70E740481C1C}">
+                <a14:useLocalDpi xmlns:a14="http://schemas.microsoft.com/office/drawing/2010/main" val="0"/>
+              </a:ext>
+              <a:ext uri="{96DAC541-7B7A-43D3-8B79-37D633B846F1}">
+                <asvg:svgBlip xmlns:asvg="http://schemas.microsoft.com/office/drawing/2016/SVG/main" r:embed="rId2"/>
+              </a:ext>
+            </a:extLst>
+          </a:blip>
+          <a:srcRect/>
+          <a:stretch>
+            <a:fillRect/>
+          </a:stretch>
+        </a:blipFill>
         <a:ln w="12700" cap="flat" cmpd="sng" algn="ctr">
           <a:solidFill>
             <a:schemeClr val="lt1">
@@ -4044,13 +4108,13 @@
           <a:avLst/>
         </a:prstGeom>
         <a:blipFill>
-          <a:blip xmlns:r="http://schemas.openxmlformats.org/officeDocument/2006/relationships" r:embed="rId1">
+          <a:blip xmlns:r="http://schemas.openxmlformats.org/officeDocument/2006/relationships" r:embed="rId3">
             <a:extLst>
               <a:ext uri="{28A0092B-C50C-407E-A947-70E740481C1C}">
                 <a14:useLocalDpi xmlns:a14="http://schemas.microsoft.com/office/drawing/2010/main" val="0"/>
               </a:ext>
               <a:ext uri="{96DAC541-7B7A-43D3-8B79-37D633B846F1}">
-                <asvg:svgBlip xmlns:asvg="http://schemas.microsoft.com/office/drawing/2016/SVG/main" r:embed="rId2"/>
+                <asvg:svgBlip xmlns:asvg="http://schemas.microsoft.com/office/drawing/2016/SVG/main" r:embed="rId4"/>
               </a:ext>
             </a:extLst>
           </a:blip>
@@ -4210,13 +4274,13 @@
           <a:avLst/>
         </a:prstGeom>
         <a:blipFill>
-          <a:blip xmlns:r="http://schemas.openxmlformats.org/officeDocument/2006/relationships" r:embed="rId3">
+          <a:blip xmlns:r="http://schemas.openxmlformats.org/officeDocument/2006/relationships" r:embed="rId5">
             <a:extLst>
               <a:ext uri="{28A0092B-C50C-407E-A947-70E740481C1C}">
                 <a14:useLocalDpi xmlns:a14="http://schemas.microsoft.com/office/drawing/2010/main" val="0"/>
               </a:ext>
               <a:ext uri="{96DAC541-7B7A-43D3-8B79-37D633B846F1}">
-                <asvg:svgBlip xmlns:asvg="http://schemas.microsoft.com/office/drawing/2016/SVG/main" r:embed="rId4"/>
+                <asvg:svgBlip xmlns:asvg="http://schemas.microsoft.com/office/drawing/2016/SVG/main" r:embed="rId6"/>
               </a:ext>
             </a:extLst>
           </a:blip>
@@ -4380,13 +4444,13 @@
           <a:avLst/>
         </a:prstGeom>
         <a:blipFill>
-          <a:blip xmlns:r="http://schemas.openxmlformats.org/officeDocument/2006/relationships" r:embed="rId5">
+          <a:blip xmlns:r="http://schemas.openxmlformats.org/officeDocument/2006/relationships" r:embed="rId7">
             <a:extLst>
               <a:ext uri="{28A0092B-C50C-407E-A947-70E740481C1C}">
                 <a14:useLocalDpi xmlns:a14="http://schemas.microsoft.com/office/drawing/2010/main" val="0"/>
               </a:ext>
               <a:ext uri="{96DAC541-7B7A-43D3-8B79-37D633B846F1}">
-                <asvg:svgBlip xmlns:asvg="http://schemas.microsoft.com/office/drawing/2016/SVG/main" r:embed="rId6"/>
+                <asvg:svgBlip xmlns:asvg="http://schemas.microsoft.com/office/drawing/2016/SVG/main" r:embed="rId8"/>
               </a:ext>
             </a:extLst>
           </a:blip>
@@ -7155,7 +7219,7 @@
           <a:p>
             <a:fld id="{B8C2ADEA-C972-4449-A45B-046BE606EF3A}" type="datetimeFigureOut">
               <a:rPr lang="en-US" smtClean="0"/>
-              <a:t>12/10/2018</a:t>
+              <a:t>12/12/2018</a:t>
             </a:fld>
             <a:endParaRPr lang="en-US"/>
           </a:p>
@@ -7353,7 +7417,7 @@
           <a:p>
             <a:fld id="{B8C2ADEA-C972-4449-A45B-046BE606EF3A}" type="datetimeFigureOut">
               <a:rPr lang="en-US" smtClean="0"/>
-              <a:t>12/10/2018</a:t>
+              <a:t>12/12/2018</a:t>
             </a:fld>
             <a:endParaRPr lang="en-US"/>
           </a:p>
@@ -7561,7 +7625,7 @@
           <a:p>
             <a:fld id="{B8C2ADEA-C972-4449-A45B-046BE606EF3A}" type="datetimeFigureOut">
               <a:rPr lang="en-US" smtClean="0"/>
-              <a:t>12/10/2018</a:t>
+              <a:t>12/12/2018</a:t>
             </a:fld>
             <a:endParaRPr lang="en-US"/>
           </a:p>
@@ -7759,7 +7823,7 @@
           <a:p>
             <a:fld id="{B8C2ADEA-C972-4449-A45B-046BE606EF3A}" type="datetimeFigureOut">
               <a:rPr lang="en-US" smtClean="0"/>
-              <a:t>12/10/2018</a:t>
+              <a:t>12/12/2018</a:t>
             </a:fld>
             <a:endParaRPr lang="en-US"/>
           </a:p>
@@ -8034,7 +8098,7 @@
           <a:p>
             <a:fld id="{B8C2ADEA-C972-4449-A45B-046BE606EF3A}" type="datetimeFigureOut">
               <a:rPr lang="en-US" smtClean="0"/>
-              <a:t>12/10/2018</a:t>
+              <a:t>12/12/2018</a:t>
             </a:fld>
             <a:endParaRPr lang="en-US"/>
           </a:p>
@@ -8299,7 +8363,7 @@
           <a:p>
             <a:fld id="{B8C2ADEA-C972-4449-A45B-046BE606EF3A}" type="datetimeFigureOut">
               <a:rPr lang="en-US" smtClean="0"/>
-              <a:t>12/10/2018</a:t>
+              <a:t>12/12/2018</a:t>
             </a:fld>
             <a:endParaRPr lang="en-US"/>
           </a:p>
@@ -8711,7 +8775,7 @@
           <a:p>
             <a:fld id="{B8C2ADEA-C972-4449-A45B-046BE606EF3A}" type="datetimeFigureOut">
               <a:rPr lang="en-US" smtClean="0"/>
-              <a:t>12/10/2018</a:t>
+              <a:t>12/12/2018</a:t>
             </a:fld>
             <a:endParaRPr lang="en-US"/>
           </a:p>
@@ -8852,7 +8916,7 @@
           <a:p>
             <a:fld id="{B8C2ADEA-C972-4449-A45B-046BE606EF3A}" type="datetimeFigureOut">
               <a:rPr lang="en-US" smtClean="0"/>
-              <a:t>12/10/2018</a:t>
+              <a:t>12/12/2018</a:t>
             </a:fld>
             <a:endParaRPr lang="en-US"/>
           </a:p>
@@ -8965,7 +9029,7 @@
           <a:p>
             <a:fld id="{B8C2ADEA-C972-4449-A45B-046BE606EF3A}" type="datetimeFigureOut">
               <a:rPr lang="en-US" smtClean="0"/>
-              <a:t>12/10/2018</a:t>
+              <a:t>12/12/2018</a:t>
             </a:fld>
             <a:endParaRPr lang="en-US"/>
           </a:p>
@@ -9276,7 +9340,7 @@
           <a:p>
             <a:fld id="{B8C2ADEA-C972-4449-A45B-046BE606EF3A}" type="datetimeFigureOut">
               <a:rPr lang="en-US" smtClean="0"/>
-              <a:t>12/10/2018</a:t>
+              <a:t>12/12/2018</a:t>
             </a:fld>
             <a:endParaRPr lang="en-US"/>
           </a:p>
@@ -9564,7 +9628,7 @@
           <a:p>
             <a:fld id="{B8C2ADEA-C972-4449-A45B-046BE606EF3A}" type="datetimeFigureOut">
               <a:rPr lang="en-US" smtClean="0"/>
-              <a:t>12/10/2018</a:t>
+              <a:t>12/12/2018</a:t>
             </a:fld>
             <a:endParaRPr lang="en-US"/>
           </a:p>
@@ -9805,7 +9869,7 @@
           <a:p>
             <a:fld id="{B8C2ADEA-C972-4449-A45B-046BE606EF3A}" type="datetimeFigureOut">
               <a:rPr lang="en-US" smtClean="0"/>
-              <a:t>12/10/2018</a:t>
+              <a:t>12/12/2018</a:t>
             </a:fld>
             <a:endParaRPr lang="en-US"/>
           </a:p>
@@ -12362,7 +12426,7 @@
             <p:ph idx="1"/>
             <p:extLst>
               <p:ext uri="{D42A27DB-BD31-4B8C-83A1-F6EECF244321}">
-                <p14:modId xmlns:p14="http://schemas.microsoft.com/office/powerpoint/2010/main" val="3001327524"/>
+                <p14:modId xmlns:p14="http://schemas.microsoft.com/office/powerpoint/2010/main" val="3377753584"/>
               </p:ext>
             </p:extLst>
           </p:nvPr>
@@ -12622,7 +12686,7 @@
             <p:ph idx="1"/>
             <p:extLst>
               <p:ext uri="{D42A27DB-BD31-4B8C-83A1-F6EECF244321}">
-                <p14:modId xmlns:p14="http://schemas.microsoft.com/office/powerpoint/2010/main" val="610814645"/>
+                <p14:modId xmlns:p14="http://schemas.microsoft.com/office/powerpoint/2010/main" val="323699022"/>
               </p:ext>
             </p:extLst>
           </p:nvPr>

</xml_diff>